<commit_message>
Ajout de la presentation en format pdf
</commit_message>
<xml_diff>
--- a/Dialogflow_Presentation.pptx
+++ b/Dialogflow_Presentation.pptx
@@ -316,7 +316,7 @@
               <a:rPr lang="en-US" smtClean="0"/>
               <a:t>6/9/2025</a:t>
             </a:fld>
-            <a:endParaRPr lang="en-US"/>
+            <a:endParaRPr lang="en-US" dirty="0"/>
           </a:p>
         </p:txBody>
       </p:sp>
@@ -335,7 +335,7 @@
           <a:bodyPr/>
           <a:lstStyle/>
           <a:p>
-            <a:endParaRPr lang="en-US"/>
+            <a:endParaRPr lang="en-US" dirty="0"/>
           </a:p>
         </p:txBody>
       </p:sp>
@@ -358,7 +358,7 @@
               <a:rPr lang="en-US" smtClean="0"/>
               <a:t>‹N°›</a:t>
             </a:fld>
-            <a:endParaRPr lang="en-US"/>
+            <a:endParaRPr lang="en-US" dirty="0"/>
           </a:p>
         </p:txBody>
       </p:sp>
@@ -484,7 +484,7 @@
               <a:rPr lang="en-US" smtClean="0"/>
               <a:t>6/9/2025</a:t>
             </a:fld>
-            <a:endParaRPr lang="en-US"/>
+            <a:endParaRPr lang="en-US" dirty="0"/>
           </a:p>
         </p:txBody>
       </p:sp>
@@ -503,7 +503,7 @@
           <a:bodyPr/>
           <a:lstStyle/>
           <a:p>
-            <a:endParaRPr lang="en-US"/>
+            <a:endParaRPr lang="en-US" dirty="0"/>
           </a:p>
         </p:txBody>
       </p:sp>
@@ -526,7 +526,7 @@
               <a:rPr lang="en-US" smtClean="0"/>
               <a:t>‹N°›</a:t>
             </a:fld>
-            <a:endParaRPr lang="en-US"/>
+            <a:endParaRPr lang="en-US" dirty="0"/>
           </a:p>
         </p:txBody>
       </p:sp>
@@ -662,7 +662,7 @@
               <a:rPr lang="en-US" smtClean="0"/>
               <a:t>6/9/2025</a:t>
             </a:fld>
-            <a:endParaRPr lang="en-US"/>
+            <a:endParaRPr lang="en-US" dirty="0"/>
           </a:p>
         </p:txBody>
       </p:sp>
@@ -681,7 +681,7 @@
           <a:bodyPr/>
           <a:lstStyle/>
           <a:p>
-            <a:endParaRPr lang="en-US"/>
+            <a:endParaRPr lang="en-US" dirty="0"/>
           </a:p>
         </p:txBody>
       </p:sp>
@@ -704,7 +704,7 @@
               <a:rPr lang="en-US" smtClean="0"/>
               <a:t>‹N°›</a:t>
             </a:fld>
-            <a:endParaRPr lang="en-US"/>
+            <a:endParaRPr lang="en-US" dirty="0"/>
           </a:p>
         </p:txBody>
       </p:sp>
@@ -830,7 +830,7 @@
               <a:rPr lang="en-US" smtClean="0"/>
               <a:t>6/9/2025</a:t>
             </a:fld>
-            <a:endParaRPr lang="en-US"/>
+            <a:endParaRPr lang="en-US" dirty="0"/>
           </a:p>
         </p:txBody>
       </p:sp>
@@ -849,7 +849,7 @@
           <a:bodyPr/>
           <a:lstStyle/>
           <a:p>
-            <a:endParaRPr lang="en-US"/>
+            <a:endParaRPr lang="en-US" dirty="0"/>
           </a:p>
         </p:txBody>
       </p:sp>
@@ -872,7 +872,7 @@
               <a:rPr lang="en-US" smtClean="0"/>
               <a:t>‹N°›</a:t>
             </a:fld>
-            <a:endParaRPr lang="en-US"/>
+            <a:endParaRPr lang="en-US" dirty="0"/>
           </a:p>
         </p:txBody>
       </p:sp>
@@ -1075,7 +1075,7 @@
               <a:rPr lang="en-US" smtClean="0"/>
               <a:t>6/9/2025</a:t>
             </a:fld>
-            <a:endParaRPr lang="en-US"/>
+            <a:endParaRPr lang="en-US" dirty="0"/>
           </a:p>
         </p:txBody>
       </p:sp>
@@ -1094,7 +1094,7 @@
           <a:bodyPr/>
           <a:lstStyle/>
           <a:p>
-            <a:endParaRPr lang="en-US"/>
+            <a:endParaRPr lang="en-US" dirty="0"/>
           </a:p>
         </p:txBody>
       </p:sp>
@@ -1117,7 +1117,7 @@
               <a:rPr lang="en-US" smtClean="0"/>
               <a:t>‹N°›</a:t>
             </a:fld>
-            <a:endParaRPr lang="en-US"/>
+            <a:endParaRPr lang="en-US" dirty="0"/>
           </a:p>
         </p:txBody>
       </p:sp>
@@ -1360,7 +1360,7 @@
               <a:rPr lang="en-US" smtClean="0"/>
               <a:t>6/9/2025</a:t>
             </a:fld>
-            <a:endParaRPr lang="en-US"/>
+            <a:endParaRPr lang="en-US" dirty="0"/>
           </a:p>
         </p:txBody>
       </p:sp>
@@ -1379,7 +1379,7 @@
           <a:bodyPr/>
           <a:lstStyle/>
           <a:p>
-            <a:endParaRPr lang="en-US"/>
+            <a:endParaRPr lang="en-US" dirty="0"/>
           </a:p>
         </p:txBody>
       </p:sp>
@@ -1402,7 +1402,7 @@
               <a:rPr lang="en-US" smtClean="0"/>
               <a:t>‹N°›</a:t>
             </a:fld>
-            <a:endParaRPr lang="en-US"/>
+            <a:endParaRPr lang="en-US" dirty="0"/>
           </a:p>
         </p:txBody>
       </p:sp>
@@ -1779,7 +1779,7 @@
               <a:rPr lang="en-US" smtClean="0"/>
               <a:t>6/9/2025</a:t>
             </a:fld>
-            <a:endParaRPr lang="en-US"/>
+            <a:endParaRPr lang="en-US" dirty="0"/>
           </a:p>
         </p:txBody>
       </p:sp>
@@ -1798,7 +1798,7 @@
           <a:bodyPr/>
           <a:lstStyle/>
           <a:p>
-            <a:endParaRPr lang="en-US"/>
+            <a:endParaRPr lang="en-US" dirty="0"/>
           </a:p>
         </p:txBody>
       </p:sp>
@@ -1821,7 +1821,7 @@
               <a:rPr lang="en-US" smtClean="0"/>
               <a:t>‹N°›</a:t>
             </a:fld>
-            <a:endParaRPr lang="en-US"/>
+            <a:endParaRPr lang="en-US" dirty="0"/>
           </a:p>
         </p:txBody>
       </p:sp>
@@ -1896,7 +1896,7 @@
               <a:rPr lang="en-US" smtClean="0"/>
               <a:t>6/9/2025</a:t>
             </a:fld>
-            <a:endParaRPr lang="en-US"/>
+            <a:endParaRPr lang="en-US" dirty="0"/>
           </a:p>
         </p:txBody>
       </p:sp>
@@ -1915,7 +1915,7 @@
           <a:bodyPr/>
           <a:lstStyle/>
           <a:p>
-            <a:endParaRPr lang="en-US"/>
+            <a:endParaRPr lang="en-US" dirty="0"/>
           </a:p>
         </p:txBody>
       </p:sp>
@@ -1938,7 +1938,7 @@
               <a:rPr lang="en-US" smtClean="0"/>
               <a:t>‹N°›</a:t>
             </a:fld>
-            <a:endParaRPr lang="en-US"/>
+            <a:endParaRPr lang="en-US" dirty="0"/>
           </a:p>
         </p:txBody>
       </p:sp>
@@ -1991,7 +1991,7 @@
               <a:rPr lang="en-US" smtClean="0"/>
               <a:t>6/9/2025</a:t>
             </a:fld>
-            <a:endParaRPr lang="en-US"/>
+            <a:endParaRPr lang="en-US" dirty="0"/>
           </a:p>
         </p:txBody>
       </p:sp>
@@ -2010,7 +2010,7 @@
           <a:bodyPr/>
           <a:lstStyle/>
           <a:p>
-            <a:endParaRPr lang="en-US"/>
+            <a:endParaRPr lang="en-US" dirty="0"/>
           </a:p>
         </p:txBody>
       </p:sp>
@@ -2033,7 +2033,7 @@
               <a:rPr lang="en-US" smtClean="0"/>
               <a:t>‹N°›</a:t>
             </a:fld>
-            <a:endParaRPr lang="en-US"/>
+            <a:endParaRPr lang="en-US" dirty="0"/>
           </a:p>
         </p:txBody>
       </p:sp>
@@ -2266,7 +2266,7 @@
               <a:rPr lang="en-US" smtClean="0"/>
               <a:t>6/9/2025</a:t>
             </a:fld>
-            <a:endParaRPr lang="en-US"/>
+            <a:endParaRPr lang="en-US" dirty="0"/>
           </a:p>
         </p:txBody>
       </p:sp>
@@ -2285,7 +2285,7 @@
           <a:bodyPr/>
           <a:lstStyle/>
           <a:p>
-            <a:endParaRPr lang="en-US"/>
+            <a:endParaRPr lang="en-US" dirty="0"/>
           </a:p>
         </p:txBody>
       </p:sp>
@@ -2308,7 +2308,7 @@
               <a:rPr lang="en-US" smtClean="0"/>
               <a:t>‹N°›</a:t>
             </a:fld>
-            <a:endParaRPr lang="en-US"/>
+            <a:endParaRPr lang="en-US" dirty="0"/>
           </a:p>
         </p:txBody>
       </p:sp>
@@ -2430,7 +2430,7 @@
             </a:lvl9pPr>
           </a:lstStyle>
           <a:p>
-            <a:endParaRPr lang="en-US"/>
+            <a:endParaRPr lang="en-US" dirty="0"/>
           </a:p>
         </p:txBody>
       </p:sp>
@@ -2518,7 +2518,7 @@
               <a:rPr lang="en-US" smtClean="0"/>
               <a:t>6/9/2025</a:t>
             </a:fld>
-            <a:endParaRPr lang="en-US"/>
+            <a:endParaRPr lang="en-US" dirty="0"/>
           </a:p>
         </p:txBody>
       </p:sp>
@@ -2537,7 +2537,7 @@
           <a:bodyPr/>
           <a:lstStyle/>
           <a:p>
-            <a:endParaRPr lang="en-US"/>
+            <a:endParaRPr lang="en-US" dirty="0"/>
           </a:p>
         </p:txBody>
       </p:sp>
@@ -2560,7 +2560,7 @@
               <a:rPr lang="en-US" smtClean="0"/>
               <a:t>‹N°›</a:t>
             </a:fld>
-            <a:endParaRPr lang="en-US"/>
+            <a:endParaRPr lang="en-US" dirty="0"/>
           </a:p>
         </p:txBody>
       </p:sp>
@@ -2729,7 +2729,7 @@
               <a:rPr lang="en-US" smtClean="0"/>
               <a:t>6/9/2025</a:t>
             </a:fld>
-            <a:endParaRPr lang="en-US"/>
+            <a:endParaRPr lang="en-US" dirty="0"/>
           </a:p>
         </p:txBody>
       </p:sp>
@@ -2766,7 +2766,7 @@
             </a:lvl1pPr>
           </a:lstStyle>
           <a:p>
-            <a:endParaRPr lang="en-US"/>
+            <a:endParaRPr lang="en-US" dirty="0"/>
           </a:p>
         </p:txBody>
       </p:sp>
@@ -2807,7 +2807,7 @@
               <a:rPr lang="en-US" smtClean="0"/>
               <a:t>‹N°›</a:t>
             </a:fld>
-            <a:endParaRPr lang="en-US"/>
+            <a:endParaRPr lang="en-US" dirty="0"/>
           </a:p>
         </p:txBody>
       </p:sp>
@@ -3131,7 +3131,7 @@
           <a:lstStyle/>
           <a:p>
             <a:r>
-              <a:rPr dirty="0" err="1"/>
+              <a:rPr lang="fr-CH" dirty="0"/>
               <a:t>Utilisation</a:t>
             </a:r>
             <a:r>
@@ -3412,15 +3412,7 @@
             </a:br>
             <a:r>
               <a:rPr lang="fr-FR" sz="2400" dirty="0"/>
-              <a:t>❌ </a:t>
-            </a:r>
-            <a:r>
-              <a:rPr lang="fr-FR" sz="2400" dirty="0" err="1"/>
-              <a:t>Vendor</a:t>
-            </a:r>
-            <a:r>
-              <a:rPr lang="fr-FR" sz="2400" dirty="0"/>
-              <a:t> lock-in (Google Cloud)</a:t>
+              <a:t>❌ Vendor lock-in (Google Cloud)</a:t>
             </a:r>
             <a:br>
               <a:rPr lang="fr-FR" sz="2400" dirty="0"/>
@@ -3788,15 +3780,7 @@
             </a:pPr>
             <a:r>
               <a:rPr lang="fr-FR" sz="2500" dirty="0"/>
-              <a:t>Tutoriels : Google </a:t>
-            </a:r>
-            <a:r>
-              <a:rPr lang="fr-FR" sz="2500" dirty="0" err="1"/>
-              <a:t>Codelabs</a:t>
-            </a:r>
-            <a:r>
-              <a:rPr lang="fr-FR" sz="2500" dirty="0"/>
-              <a:t>, YouTube, etc.</a:t>
+              <a:t>Tutoriels : Google Codelabs, YouTube, etc.</a:t>
             </a:r>
           </a:p>
           <a:p>
@@ -3814,15 +3798,7 @@
             </a:pPr>
             <a:r>
               <a:rPr lang="fr-FR" sz="2500" dirty="0"/>
-              <a:t>Intégrations : </a:t>
-            </a:r>
-            <a:r>
-              <a:rPr lang="fr-FR" sz="2500" dirty="0" err="1"/>
-              <a:t>Firebase</a:t>
-            </a:r>
-            <a:r>
-              <a:rPr lang="fr-FR" sz="2500" dirty="0"/>
-              <a:t>, Messenger, Slack, WhatsApp, etc.</a:t>
+              <a:t>Intégrations : Firebase, Messenger, Slack, WhatsApp, etc.</a:t>
             </a:r>
           </a:p>
         </p:txBody>
@@ -4095,15 +4071,7 @@
             </a:pPr>
             <a:r>
               <a:rPr lang="fr-CH" sz="2500" dirty="0"/>
-              <a:t>Qu’est-ce que </a:t>
-            </a:r>
-            <a:r>
-              <a:rPr lang="fr-CH" sz="2500" dirty="0" err="1"/>
-              <a:t>Dialogflow</a:t>
-            </a:r>
-            <a:r>
-              <a:rPr lang="fr-CH" sz="2500" dirty="0"/>
-              <a:t> ES ?</a:t>
+              <a:t>Qu’est-ce que Dialogflow ES ?</a:t>
             </a:r>
           </a:p>
           <a:p>
@@ -4135,15 +4103,7 @@
             </a:pPr>
             <a:r>
               <a:rPr lang="fr-CH" sz="2500" dirty="0"/>
-              <a:t>Démonstration d’un </a:t>
-            </a:r>
-            <a:r>
-              <a:rPr lang="fr-CH" sz="2500" dirty="0" err="1"/>
-              <a:t>chatbot</a:t>
-            </a:r>
-            <a:r>
-              <a:rPr lang="fr-CH" sz="2500" dirty="0"/>
-              <a:t> créé pour l’occasion</a:t>
+              <a:t>Démonstration d’un chatbot créé pour l’occasion</a:t>
             </a:r>
           </a:p>
           <a:p>
@@ -4255,15 +4215,7 @@
             </a:pPr>
             <a:r>
               <a:rPr lang="fr-CH" sz="3500" dirty="0"/>
-              <a:t>Qu’est-ce que </a:t>
-            </a:r>
-            <a:r>
-              <a:rPr lang="fr-CH" sz="3500" dirty="0" err="1"/>
-              <a:t>Dialogflow</a:t>
-            </a:r>
-            <a:r>
-              <a:rPr lang="fr-CH" sz="3500" dirty="0"/>
-              <a:t> ES ?</a:t>
+              <a:t>Qu’est-ce que Dialogflow ES ?</a:t>
             </a:r>
             <a:endParaRPr sz="3500" dirty="0"/>
           </a:p>
@@ -4502,20 +4454,8 @@
               </a:defRPr>
             </a:pPr>
             <a:r>
-              <a:rPr lang="fr-FR" sz="2500" dirty="0" err="1"/>
-              <a:t>Dialogflow</a:t>
-            </a:r>
-            <a:r>
               <a:rPr lang="fr-FR" sz="2500" dirty="0"/>
-              <a:t> détecte l’intention (</a:t>
-            </a:r>
-            <a:r>
-              <a:rPr lang="fr-FR" sz="2500" dirty="0" err="1"/>
-              <a:t>intent</a:t>
-            </a:r>
-            <a:r>
-              <a:rPr lang="fr-FR" sz="2500" dirty="0"/>
-              <a:t>)</a:t>
+              <a:t>Dialogflow détecte l’intention (intent)</a:t>
             </a:r>
           </a:p>
           <a:p>
@@ -4533,13 +4473,8 @@
             </a:pPr>
             <a:r>
               <a:rPr lang="fr-FR" sz="2500" dirty="0"/>
-              <a:t>Une réponse est renvoyée automatiquement ou via un </a:t>
-            </a:r>
-            <a:r>
-              <a:rPr lang="fr-FR" sz="2500" dirty="0" err="1"/>
-              <a:t>webhook</a:t>
-            </a:r>
-            <a:endParaRPr lang="fr-FR" sz="2500" dirty="0"/>
+              <a:t>Une réponse est renvoyée automatiquement ou via un webhook</a:t>
+            </a:r>
           </a:p>
           <a:p>
             <a:pPr marL="457200" indent="-457200">
@@ -4684,23 +4619,7 @@
             </a:pPr>
             <a:r>
               <a:rPr lang="fr-FR" sz="3500" dirty="0"/>
-              <a:t>Comment créer un </a:t>
-            </a:r>
-            <a:r>
-              <a:rPr lang="fr-FR" sz="3500" dirty="0" err="1"/>
-              <a:t>chatbot</a:t>
-            </a:r>
-            <a:r>
-              <a:rPr lang="fr-FR" sz="3500" dirty="0"/>
-              <a:t> avec </a:t>
-            </a:r>
-            <a:r>
-              <a:rPr lang="fr-FR" sz="3500" dirty="0" err="1"/>
-              <a:t>Dialogflow</a:t>
-            </a:r>
-            <a:r>
-              <a:rPr lang="fr-FR" sz="3500" dirty="0"/>
-              <a:t> ?</a:t>
+              <a:t>Comment créer un chatbot avec Dialogflow ?</a:t>
             </a:r>
             <a:endParaRPr lang="fr-CH" sz="3500" dirty="0"/>
           </a:p>
@@ -4760,15 +4679,7 @@
             </a:pPr>
             <a:r>
               <a:rPr lang="fr-FR" sz="2500" dirty="0"/>
-              <a:t>Ajouter des </a:t>
-            </a:r>
-            <a:r>
-              <a:rPr lang="fr-FR" sz="2500" dirty="0" err="1"/>
-              <a:t>intents</a:t>
-            </a:r>
-            <a:r>
-              <a:rPr lang="fr-FR" sz="2500" dirty="0"/>
-              <a:t> (ex : horaires, contact…)</a:t>
+              <a:t>Ajouter des intents (ex : horaires, contact…)</a:t>
             </a:r>
           </a:p>
           <a:p>
@@ -4804,13 +4715,8 @@
             </a:pPr>
             <a:r>
               <a:rPr lang="fr-FR" sz="2500" dirty="0"/>
-              <a:t>Ajouter une réponse pour chaque </a:t>
-            </a:r>
-            <a:r>
-              <a:rPr lang="fr-FR" sz="2500" dirty="0" err="1"/>
-              <a:t>intent</a:t>
-            </a:r>
-            <a:endParaRPr lang="fr-FR" sz="2500" dirty="0"/>
+              <a:t>Ajouter une réponse pour chaque intent</a:t>
+            </a:r>
           </a:p>
           <a:p>
             <a:pPr marL="457200" indent="-457200">
@@ -4827,15 +4733,7 @@
             </a:pPr>
             <a:r>
               <a:rPr lang="fr-FR" sz="2500" dirty="0"/>
-              <a:t>Tester le </a:t>
-            </a:r>
-            <a:r>
-              <a:rPr lang="fr-FR" sz="2500" dirty="0" err="1"/>
-              <a:t>chatbot</a:t>
-            </a:r>
-            <a:r>
-              <a:rPr lang="fr-FR" sz="2500" dirty="0"/>
-              <a:t> dans la console</a:t>
+              <a:t>Tester le chatbot dans la console</a:t>
             </a:r>
           </a:p>
           <a:p>
@@ -5256,15 +5154,7 @@
             </a:br>
             <a:r>
               <a:rPr lang="fr-FR" sz="2500" dirty="0"/>
-              <a:t>Nous explorons les </a:t>
-            </a:r>
-            <a:r>
-              <a:rPr lang="fr-FR" sz="2500" dirty="0" err="1"/>
-              <a:t>chatbots</a:t>
-            </a:r>
-            <a:r>
-              <a:rPr lang="fr-FR" sz="2500" dirty="0"/>
-              <a:t> cloud pour :</a:t>
+              <a:t>Nous explorons les chatbots cloud pour :</a:t>
             </a:r>
             <a:endParaRPr lang="fr-CH" sz="2500" dirty="0"/>
           </a:p>
@@ -5581,15 +5471,7 @@
             </a:pPr>
             <a:r>
               <a:rPr lang="fr-FR" sz="3500" dirty="0"/>
-              <a:t>Démo - </a:t>
-            </a:r>
-            <a:r>
-              <a:rPr lang="fr-FR" sz="3500" dirty="0" err="1"/>
-              <a:t>Chatbot</a:t>
-            </a:r>
-            <a:r>
-              <a:rPr lang="fr-FR" sz="3500" dirty="0"/>
-              <a:t> FAQ pour une PME</a:t>
+              <a:t>Démo - Chatbot FAQ pour une PME</a:t>
             </a:r>
             <a:endParaRPr lang="fr-CH" sz="3500" dirty="0"/>
           </a:p>
@@ -5631,21 +5513,8 @@
             </a:pPr>
             <a:r>
               <a:rPr lang="fr-FR" sz="2500" dirty="0"/>
-              <a:t>3 </a:t>
-            </a:r>
-            <a:r>
-              <a:rPr lang="fr-FR" sz="2500" dirty="0" err="1"/>
-              <a:t>intents</a:t>
-            </a:r>
-            <a:r>
-              <a:rPr lang="fr-FR" sz="2500" dirty="0"/>
-              <a:t> : horaires d’ouverture, disponibilité produit</a:t>
-            </a:r>
-            <a:r>
-              <a:rPr lang="fr-FR" sz="2500"/>
-              <a:t>, contact</a:t>
-            </a:r>
-            <a:endParaRPr lang="fr-FR" sz="2500" dirty="0"/>
+              <a:t>3 intents : horaires d’ouverture, disponibilité produit, contact</a:t>
+            </a:r>
           </a:p>
           <a:p>
             <a:pPr>
@@ -5680,15 +5549,7 @@
             </a:pPr>
             <a:r>
               <a:rPr lang="fr-FR" sz="2500" dirty="0"/>
-              <a:t>Intégration en </a:t>
-            </a:r>
-            <a:r>
-              <a:rPr lang="fr-FR" sz="2500" dirty="0" err="1"/>
-              <a:t>iframe</a:t>
-            </a:r>
-            <a:r>
-              <a:rPr lang="fr-FR" sz="2500" dirty="0"/>
-              <a:t> dans un site vitrine</a:t>
+              <a:t>Intégration en iframe dans un site vitrine</a:t>
             </a:r>
           </a:p>
         </p:txBody>
@@ -5867,15 +5728,7 @@
             </a:pPr>
             <a:r>
               <a:rPr lang="fr-FR" sz="2500" dirty="0"/>
-              <a:t>Hébergement </a:t>
-            </a:r>
-            <a:r>
-              <a:rPr lang="fr-FR" sz="2500" dirty="0" err="1"/>
-              <a:t>Firebase</a:t>
-            </a:r>
-            <a:r>
-              <a:rPr lang="fr-FR" sz="2500" dirty="0"/>
-              <a:t>/Web : ~5 CHF / mois💰</a:t>
+              <a:t>Hébergement Firebase/Web : ~5 CHF / mois💰</a:t>
             </a:r>
           </a:p>
           <a:p>

</xml_diff>

<commit_message>
Modifications du powerpoint selon accord entre Aude et Nathan
</commit_message>
<xml_diff>
--- a/Dialogflow_Presentation.pptx
+++ b/Dialogflow_Presentation.pptx
@@ -5489,8 +5489,8 @@
         </p:nvSpPr>
         <p:spPr>
           <a:xfrm>
-            <a:off x="457200" y="2260047"/>
-            <a:ext cx="8229600" cy="2858026"/>
+            <a:off x="457200" y="2377886"/>
+            <a:ext cx="8229600" cy="2102228"/>
           </a:xfrm>
         </p:spPr>
         <p:txBody>
@@ -5532,24 +5532,6 @@
             <a:r>
               <a:rPr lang="fr-FR" sz="2500" dirty="0"/>
               <a:t>Réponses personnalisées simples</a:t>
-            </a:r>
-          </a:p>
-          <a:p>
-            <a:pPr>
-              <a:lnSpc>
-                <a:spcPct val="150000"/>
-              </a:lnSpc>
-              <a:buFont typeface="Arial" panose="020B0604020202020204" pitchFamily="34" charset="0"/>
-              <a:buChar char="•"/>
-              <a:defRPr sz="2000">
-                <a:solidFill>
-                  <a:srgbClr val="000000"/>
-                </a:solidFill>
-              </a:defRPr>
-            </a:pPr>
-            <a:r>
-              <a:rPr lang="fr-FR" sz="2500" dirty="0"/>
-              <a:t>Intégration en iframe dans un site vitrine</a:t>
             </a:r>
           </a:p>
         </p:txBody>

</xml_diff>